<commit_message>
Add companion-desktop screenshot to slides and PPTX
</commit_message>
<xml_diff>
--- a/docs/LuLuAI-Pitch.pptx
+++ b/docs/LuLuAI-Pitch.pptx
@@ -17,6 +17,7 @@
     <p:sldId id="265" r:id="rId16"/>
     <p:sldId id="266" r:id="rId17"/>
     <p:sldId id="267" r:id="rId18"/>
+    <p:sldId id="268" r:id="rId19"/>
   </p:sldIdLst>
   <p:sldSz cx="12191695" cy="6858000" type="screen4x3"/>
   <p:notesSz cx="6858000" cy="9144000"/>
@@ -3316,8 +3317,8 @@
         </p:nvSpPr>
         <p:spPr>
           <a:xfrm>
-            <a:off x="0" y="457200"/>
-            <a:ext cx="12191695" cy="731520"/>
+            <a:off x="0" y="274320"/>
+            <a:ext cx="12191695" cy="548640"/>
           </a:xfrm>
           <a:prstGeom prst="rect">
             <a:avLst/>
@@ -3331,72 +3332,28 @@
           <a:lstStyle/>
           <a:p>
             <a:pPr algn="ctr">
-              <a:defRPr sz="4000" b="1">
-                <a:solidFill>
-                  <a:srgbClr val="FFFFFF"/>
-                </a:solidFill>
-              </a:defRPr>
-            </a:pPr>
-            <a:r>
-              <a:t>Demo</a:t>
-            </a:r>
-          </a:p>
-        </p:txBody>
-      </p:sp>
-      <p:sp>
-        <p:nvSpPr>
-          <p:cNvPr id="3" name="Rectangle 2"/>
-          <p:cNvSpPr/>
-          <p:nvPr/>
-        </p:nvSpPr>
-        <p:spPr>
-          <a:xfrm>
-            <a:off x="1371600" y="1828800"/>
-            <a:ext cx="4389120" cy="3200400"/>
-          </a:xfrm>
-          <a:prstGeom prst="rect">
-            <a:avLst/>
-          </a:prstGeom>
-          <a:solidFill>
-            <a:srgbClr val="1E293B"/>
-          </a:solidFill>
-          <a:ln>
-            <a:noFill/>
-          </a:ln>
-          <a:effectLst/>
-        </p:spPr>
-        <p:style>
-          <a:lnRef idx="1">
-            <a:schemeClr val="accent1"/>
-          </a:lnRef>
-          <a:fillRef idx="3">
-            <a:schemeClr val="accent1"/>
-          </a:fillRef>
-          <a:effectRef idx="2">
-            <a:schemeClr val="accent1"/>
-          </a:effectRef>
-          <a:fontRef idx="minor">
-            <a:schemeClr val="lt1"/>
-          </a:fontRef>
-        </p:style>
-        <p:txBody>
-          <a:bodyPr rtlCol="0" anchor="ctr"/>
-          <a:lstStyle/>
-          <a:p>
-            <a:pPr algn="ctr"/>
-          </a:p>
-        </p:txBody>
-      </p:sp>
-      <p:sp>
-        <p:nvSpPr>
-          <p:cNvPr id="4" name="TextBox 3"/>
+              <a:defRPr sz="3600" b="1">
+                <a:solidFill>
+                  <a:srgbClr val="FFFFFF"/>
+                </a:solidFill>
+              </a:defRPr>
+            </a:pPr>
+            <a:r>
+              <a:t>Architecture</a:t>
+            </a:r>
+          </a:p>
+        </p:txBody>
+      </p:sp>
+      <p:sp>
+        <p:nvSpPr>
+          <p:cNvPr id="3" name="TextBox 2"/>
           <p:cNvSpPr txBox="1"/>
           <p:nvPr/>
         </p:nvSpPr>
         <p:spPr>
           <a:xfrm>
-            <a:off x="1554480" y="1920240"/>
-            <a:ext cx="4023360" cy="457200"/>
+            <a:off x="1828800" y="1097280"/>
+            <a:ext cx="8503920" cy="5029200"/>
           </a:xfrm>
           <a:prstGeom prst="rect">
             <a:avLst/>
@@ -3409,226 +3366,100 @@
           </a:bodyPr>
           <a:lstStyle/>
           <a:p>
-            <a:pPr algn="ctr">
-              <a:defRPr sz="4800" b="0">
-                <a:solidFill>
-                  <a:srgbClr val="FFFFFF"/>
-                </a:solidFill>
-              </a:defRPr>
-            </a:pPr>
-            <a:r>
-              <a:t>🤖</a:t>
-            </a:r>
-          </a:p>
-          <a:p>
-            <a:pPr algn="ctr">
-              <a:defRPr sz="2200" b="1">
-                <a:solidFill>
-                  <a:srgbClr val="60A5FA"/>
-                </a:solidFill>
-              </a:defRPr>
-            </a:pPr>
-            <a:r>
-              <a:t>AI Agent Skill</a:t>
-            </a:r>
-          </a:p>
-          <a:p>
-            <a:pPr algn="l">
-              <a:defRPr sz="1000" b="0">
-                <a:solidFill>
-                  <a:srgbClr val="FFFFFF"/>
-                </a:solidFill>
-              </a:defRPr>
-            </a:pPr>
-          </a:p>
-          <a:p>
-            <a:pPr algn="ctr">
-              <a:defRPr sz="1400" b="0">
-                <a:solidFill>
-                  <a:srgbClr val="FFFFFF"/>
-                </a:solidFill>
-              </a:defRPr>
-            </a:pPr>
-            <a:r>
-              <a:t>Trigger a LuLu alert → AI analyzes</a:t>
-            </a:r>
-          </a:p>
-          <a:p>
-            <a:pPr algn="ctr">
-              <a:defRPr sz="1400" b="0">
-                <a:solidFill>
-                  <a:srgbClr val="FFFFFF"/>
-                </a:solidFill>
-              </a:defRPr>
-            </a:pPr>
-            <a:r>
-              <a:t>→ Telegram notification → Tap Allow/Block</a:t>
-            </a:r>
-          </a:p>
-          <a:p>
-            <a:pPr algn="l">
-              <a:defRPr sz="1000" b="0">
-                <a:solidFill>
-                  <a:srgbClr val="FFFFFF"/>
-                </a:solidFill>
-              </a:defRPr>
-            </a:pPr>
-          </a:p>
-          <a:p>
-            <a:pPr algn="ctr">
-              <a:defRPr sz="1400" b="0">
-                <a:solidFill>
-                  <a:srgbClr val="A78BFA"/>
-                </a:solidFill>
-              </a:defRPr>
-            </a:pPr>
-            <a:r>
-              <a:t>Live on Mac</a:t>
-            </a:r>
-          </a:p>
-        </p:txBody>
-      </p:sp>
-      <p:sp>
-        <p:nvSpPr>
-          <p:cNvPr id="5" name="Rectangle 4"/>
-          <p:cNvSpPr/>
-          <p:nvPr/>
-        </p:nvSpPr>
-        <p:spPr>
-          <a:xfrm>
-            <a:off x="6400800" y="1828800"/>
-            <a:ext cx="4389120" cy="3200400"/>
-          </a:xfrm>
-          <a:prstGeom prst="rect">
-            <a:avLst/>
-          </a:prstGeom>
-          <a:solidFill>
-            <a:srgbClr val="1E293B"/>
-          </a:solidFill>
-          <a:ln>
-            <a:noFill/>
-          </a:ln>
-          <a:effectLst/>
-        </p:spPr>
-        <p:style>
-          <a:lnRef idx="1">
-            <a:schemeClr val="accent1"/>
-          </a:lnRef>
-          <a:fillRef idx="3">
-            <a:schemeClr val="accent1"/>
-          </a:fillRef>
-          <a:effectRef idx="2">
-            <a:schemeClr val="accent1"/>
-          </a:effectRef>
-          <a:fontRef idx="minor">
-            <a:schemeClr val="lt1"/>
-          </a:fontRef>
-        </p:style>
-        <p:txBody>
-          <a:bodyPr rtlCol="0" anchor="ctr"/>
-          <a:lstStyle/>
-          <a:p>
-            <a:pPr algn="ctr"/>
-          </a:p>
-        </p:txBody>
-      </p:sp>
-      <p:sp>
-        <p:nvSpPr>
-          <p:cNvPr id="6" name="TextBox 5"/>
-          <p:cNvSpPr txBox="1"/>
-          <p:nvPr/>
-        </p:nvSpPr>
-        <p:spPr>
-          <a:xfrm>
-            <a:off x="6583680" y="1920240"/>
-            <a:ext cx="4023360" cy="457200"/>
-          </a:xfrm>
-          <a:prstGeom prst="rect">
-            <a:avLst/>
-          </a:prstGeom>
-          <a:noFill/>
-        </p:spPr>
-        <p:txBody>
-          <a:bodyPr wrap="square">
-            <a:spAutoFit/>
-          </a:bodyPr>
-          <a:lstStyle/>
-          <a:p>
-            <a:pPr algn="ctr">
-              <a:defRPr sz="4800" b="0">
-                <a:solidFill>
-                  <a:srgbClr val="FFFFFF"/>
-                </a:solidFill>
-              </a:defRPr>
-            </a:pPr>
-            <a:r>
-              <a:t>💰</a:t>
-            </a:r>
-          </a:p>
-          <a:p>
-            <a:pPr algn="ctr">
-              <a:defRPr sz="2200" b="1">
-                <a:solidFill>
-                  <a:srgbClr val="60A5FA"/>
-                </a:solidFill>
-              </a:defRPr>
-            </a:pPr>
-            <a:r>
-              <a:t>3mate Platform</a:t>
-            </a:r>
-          </a:p>
-          <a:p>
-            <a:pPr algn="l">
-              <a:defRPr sz="1000" b="0">
-                <a:solidFill>
-                  <a:srgbClr val="FFFFFF"/>
-                </a:solidFill>
-              </a:defRPr>
-            </a:pPr>
-          </a:p>
-          <a:p>
-            <a:pPr algn="ctr">
-              <a:defRPr sz="1400" b="0">
-                <a:solidFill>
-                  <a:srgbClr val="FFFFFF"/>
-                </a:solidFill>
-              </a:defRPr>
-            </a:pPr>
-            <a:r>
-              <a:t>Connect wallet → Mint USDC →</a:t>
-            </a:r>
-          </a:p>
-          <a:p>
-            <a:pPr algn="ctr">
-              <a:defRPr sz="1400" b="0">
-                <a:solidFill>
-                  <a:srgbClr val="FFFFFF"/>
-                </a:solidFill>
-              </a:defRPr>
-            </a:pPr>
-            <a:r>
-              <a:t>Open Tunnel → Create API Key → Use</a:t>
-            </a:r>
-          </a:p>
-          <a:p>
-            <a:pPr algn="l">
-              <a:defRPr sz="1000" b="0">
-                <a:solidFill>
-                  <a:srgbClr val="FFFFFF"/>
-                </a:solidFill>
-              </a:defRPr>
-            </a:pPr>
-          </a:p>
-          <a:p>
-            <a:pPr algn="ctr">
-              <a:defRPr sz="1400" b="0">
-                <a:solidFill>
-                  <a:srgbClr val="60A5FA"/>
-                </a:solidFill>
-              </a:defRPr>
-            </a:pPr>
-            <a:r>
-              <a:t>platform.3mate.io</a:t>
+            <a:pPr>
+              <a:defRPr sz="1100">
+                <a:solidFill>
+                  <a:srgbClr val="FFFFFF"/>
+                </a:solidFill>
+                <a:latin typeface="Courier New"/>
+              </a:defRPr>
+            </a:pPr>
+            <a:r>
+              <a:t>┌──────────────────────────────────────────────┐</a:t>
+            </a:r>
+            <a:br/>
+            <a:r>
+              <a:t>│                User's Mac                     │</a:t>
+            </a:r>
+            <a:br/>
+            <a:r>
+              <a:t>│                                               │</a:t>
+            </a:r>
+            <a:br/>
+            <a:r>
+              <a:t>│  ┌──────────┐    ┌─────────────────────────┐ │</a:t>
+            </a:r>
+            <a:br/>
+            <a:r>
+              <a:t>│  │  LuLu    │───→│  lulu-monitor (Skill)   │ │</a:t>
+            </a:r>
+            <a:br/>
+            <a:r>
+              <a:t>│  │ Firewall │    │  or LuLuAI (Mac App)    │ │</a:t>
+            </a:r>
+            <a:br/>
+            <a:r>
+              <a:t>│  └──────────┘    └────────────┬────────────┘ │</a:t>
+            </a:r>
+            <a:br/>
+            <a:r>
+              <a:t>└───────────────────────────────┼───────────────┘</a:t>
+            </a:r>
+            <a:br/>
+            <a:r>
+              <a:t>                                │ API Call (sk-3mate key)</a:t>
+            </a:r>
+            <a:br/>
+            <a:r>
+              <a:t>                 ┌──────────────▼──────────────┐</a:t>
+            </a:r>
+            <a:br/>
+            <a:r>
+              <a:t>                 │     3mate Platform            │</a:t>
+            </a:r>
+            <a:br/>
+            <a:r>
+              <a:t>                 │     platform.3mate.io         │</a:t>
+            </a:r>
+            <a:br/>
+            <a:r>
+              <a:t>                 │  ┌─────────┐  ┌───────────┐  │</a:t>
+            </a:r>
+            <a:br/>
+            <a:r>
+              <a:t>                 │  │ Claude  │  │ Sui Tunnel│  │</a:t>
+            </a:r>
+            <a:br/>
+            <a:r>
+              <a:t>                 │  │ Proxy   │  │ Payment   │  │</a:t>
+            </a:r>
+            <a:br/>
+            <a:r>
+              <a:t>                 │  └─────────┘  └───────────┘  │</a:t>
+            </a:r>
+            <a:br/>
+            <a:r>
+              <a:t>                 └──────────────┬───────────────┘</a:t>
+            </a:r>
+            <a:br/>
+            <a:r>
+              <a:t>                                │ On-chain claim</a:t>
+            </a:r>
+            <a:br/>
+            <a:r>
+              <a:t>                 ┌──────────────▼──────────────┐</a:t>
+            </a:r>
+            <a:br/>
+            <a:r>
+              <a:t>                 │       Sui Blockchain          │</a:t>
+            </a:r>
+            <a:br/>
+            <a:r>
+              <a:t>                 │  Tunnel + TEST_USDC + Ed25519 │</a:t>
+            </a:r>
+            <a:br/>
+            <a:r>
+              <a:t>                 └───────────────────────────────┘</a:t>
             </a:r>
           </a:p>
         </p:txBody>
@@ -3667,8 +3498,8 @@
         </p:nvSpPr>
         <p:spPr>
           <a:xfrm>
-            <a:off x="0" y="274320"/>
-            <a:ext cx="12191695" cy="548640"/>
+            <a:off x="0" y="457200"/>
+            <a:ext cx="12191695" cy="731520"/>
           </a:xfrm>
           <a:prstGeom prst="rect">
             <a:avLst/>
@@ -3682,14 +3513,14 @@
           <a:lstStyle/>
           <a:p>
             <a:pPr algn="ctr">
-              <a:defRPr sz="3600" b="1">
-                <a:solidFill>
-                  <a:srgbClr val="FFFFFF"/>
-                </a:solidFill>
-              </a:defRPr>
-            </a:pPr>
-            <a:r>
-              <a:t>Repositories</a:t>
+              <a:defRPr sz="4000" b="1">
+                <a:solidFill>
+                  <a:srgbClr val="FFFFFF"/>
+                </a:solidFill>
+              </a:defRPr>
+            </a:pPr>
+            <a:r>
+              <a:t>Demo</a:t>
             </a:r>
           </a:p>
         </p:txBody>
@@ -3702,8 +3533,8 @@
         </p:nvSpPr>
         <p:spPr>
           <a:xfrm>
-            <a:off x="1828800" y="1371600"/>
-            <a:ext cx="8534095" cy="731520"/>
+            <a:off x="1371600" y="1828800"/>
+            <a:ext cx="4389120" cy="3200400"/>
           </a:xfrm>
           <a:prstGeom prst="rect">
             <a:avLst/>
@@ -3746,8 +3577,8 @@
         </p:nvSpPr>
         <p:spPr>
           <a:xfrm>
-            <a:off x="2103120" y="1463040"/>
-            <a:ext cx="7955279" cy="548640"/>
+            <a:off x="1554480" y="1920240"/>
+            <a:ext cx="4023360" cy="457200"/>
           </a:xfrm>
           <a:prstGeom prst="rect">
             <a:avLst/>
@@ -3760,15 +3591,81 @@
           </a:bodyPr>
           <a:lstStyle/>
           <a:p>
-            <a:pPr algn="l">
-              <a:defRPr sz="1600" b="0">
-                <a:solidFill>
-                  <a:srgbClr val="FFFFFF"/>
-                </a:solidFill>
-              </a:defRPr>
-            </a:pPr>
-            <a:r>
-              <a:t>🤖 AI Agent Skill  -  github.com/EasonC13-agent/lulu-monitor</a:t>
+            <a:pPr algn="ctr">
+              <a:defRPr sz="4800" b="0">
+                <a:solidFill>
+                  <a:srgbClr val="FFFFFF"/>
+                </a:solidFill>
+              </a:defRPr>
+            </a:pPr>
+            <a:r>
+              <a:t>🤖</a:t>
+            </a:r>
+          </a:p>
+          <a:p>
+            <a:pPr algn="ctr">
+              <a:defRPr sz="2200" b="1">
+                <a:solidFill>
+                  <a:srgbClr val="60A5FA"/>
+                </a:solidFill>
+              </a:defRPr>
+            </a:pPr>
+            <a:r>
+              <a:t>AI Agent Skill</a:t>
+            </a:r>
+          </a:p>
+          <a:p>
+            <a:pPr algn="l">
+              <a:defRPr sz="1000" b="0">
+                <a:solidFill>
+                  <a:srgbClr val="FFFFFF"/>
+                </a:solidFill>
+              </a:defRPr>
+            </a:pPr>
+          </a:p>
+          <a:p>
+            <a:pPr algn="ctr">
+              <a:defRPr sz="1400" b="0">
+                <a:solidFill>
+                  <a:srgbClr val="FFFFFF"/>
+                </a:solidFill>
+              </a:defRPr>
+            </a:pPr>
+            <a:r>
+              <a:t>Trigger a LuLu alert → AI analyzes</a:t>
+            </a:r>
+          </a:p>
+          <a:p>
+            <a:pPr algn="ctr">
+              <a:defRPr sz="1400" b="0">
+                <a:solidFill>
+                  <a:srgbClr val="FFFFFF"/>
+                </a:solidFill>
+              </a:defRPr>
+            </a:pPr>
+            <a:r>
+              <a:t>→ Telegram notification → Tap Allow/Block</a:t>
+            </a:r>
+          </a:p>
+          <a:p>
+            <a:pPr algn="l">
+              <a:defRPr sz="1000" b="0">
+                <a:solidFill>
+                  <a:srgbClr val="FFFFFF"/>
+                </a:solidFill>
+              </a:defRPr>
+            </a:pPr>
+          </a:p>
+          <a:p>
+            <a:pPr algn="ctr">
+              <a:defRPr sz="1400" b="0">
+                <a:solidFill>
+                  <a:srgbClr val="A78BFA"/>
+                </a:solidFill>
+              </a:defRPr>
+            </a:pPr>
+            <a:r>
+              <a:t>Live on Mac</a:t>
             </a:r>
           </a:p>
         </p:txBody>
@@ -3781,8 +3678,8 @@
         </p:nvSpPr>
         <p:spPr>
           <a:xfrm>
-            <a:off x="1828800" y="2377440"/>
-            <a:ext cx="8534095" cy="731520"/>
+            <a:off x="6400800" y="1828800"/>
+            <a:ext cx="4389120" cy="3200400"/>
           </a:xfrm>
           <a:prstGeom prst="rect">
             <a:avLst/>
@@ -3825,8 +3722,8 @@
         </p:nvSpPr>
         <p:spPr>
           <a:xfrm>
-            <a:off x="2103120" y="2468880"/>
-            <a:ext cx="7955279" cy="548640"/>
+            <a:off x="6583680" y="1920240"/>
+            <a:ext cx="4023360" cy="457200"/>
           </a:xfrm>
           <a:prstGeom prst="rect">
             <a:avLst/>
@@ -3839,208 +3736,81 @@
           </a:bodyPr>
           <a:lstStyle/>
           <a:p>
-            <a:pPr algn="l">
-              <a:defRPr sz="1600" b="0">
-                <a:solidFill>
-                  <a:srgbClr val="FFFFFF"/>
-                </a:solidFill>
-              </a:defRPr>
-            </a:pPr>
-            <a:r>
-              <a:t>🖥️ Mac App  -  github.com/EasonC13-agent/LuLuAICompanion</a:t>
-            </a:r>
-          </a:p>
-        </p:txBody>
-      </p:sp>
-      <p:sp>
-        <p:nvSpPr>
-          <p:cNvPr id="7" name="Rectangle 6"/>
-          <p:cNvSpPr/>
-          <p:nvPr/>
-        </p:nvSpPr>
-        <p:spPr>
-          <a:xfrm>
-            <a:off x="1828800" y="3383280"/>
-            <a:ext cx="8534095" cy="731520"/>
-          </a:xfrm>
-          <a:prstGeom prst="rect">
-            <a:avLst/>
-          </a:prstGeom>
-          <a:solidFill>
-            <a:srgbClr val="1E293B"/>
-          </a:solidFill>
-          <a:ln>
-            <a:noFill/>
-          </a:ln>
-          <a:effectLst/>
-        </p:spPr>
-        <p:style>
-          <a:lnRef idx="1">
-            <a:schemeClr val="accent1"/>
-          </a:lnRef>
-          <a:fillRef idx="3">
-            <a:schemeClr val="accent1"/>
-          </a:fillRef>
-          <a:effectRef idx="2">
-            <a:schemeClr val="accent1"/>
-          </a:effectRef>
-          <a:fontRef idx="minor">
-            <a:schemeClr val="lt1"/>
-          </a:fontRef>
-        </p:style>
-        <p:txBody>
-          <a:bodyPr rtlCol="0" anchor="ctr"/>
-          <a:lstStyle/>
-          <a:p>
-            <a:pPr algn="ctr"/>
-          </a:p>
-        </p:txBody>
-      </p:sp>
-      <p:sp>
-        <p:nvSpPr>
-          <p:cNvPr id="8" name="TextBox 7"/>
-          <p:cNvSpPr txBox="1"/>
-          <p:nvPr/>
-        </p:nvSpPr>
-        <p:spPr>
-          <a:xfrm>
-            <a:off x="2103120" y="3474720"/>
-            <a:ext cx="7955279" cy="548640"/>
-          </a:xfrm>
-          <a:prstGeom prst="rect">
-            <a:avLst/>
-          </a:prstGeom>
-          <a:noFill/>
-        </p:spPr>
-        <p:txBody>
-          <a:bodyPr wrap="square">
-            <a:spAutoFit/>
-          </a:bodyPr>
-          <a:lstStyle/>
-          <a:p>
-            <a:pPr algn="l">
-              <a:defRPr sz="1600" b="0">
-                <a:solidFill>
-                  <a:srgbClr val="FFFFFF"/>
-                </a:solidFill>
-              </a:defRPr>
-            </a:pPr>
-            <a:r>
-              <a:t>💰 3mate Platform  -  github.com/EasonC13-agent/platform.3mate.io</a:t>
-            </a:r>
-          </a:p>
-        </p:txBody>
-      </p:sp>
-      <p:sp>
-        <p:nvSpPr>
-          <p:cNvPr id="9" name="Rectangle 8"/>
-          <p:cNvSpPr/>
-          <p:nvPr/>
-        </p:nvSpPr>
-        <p:spPr>
-          <a:xfrm>
-            <a:off x="1828800" y="4389120"/>
-            <a:ext cx="8534095" cy="731520"/>
-          </a:xfrm>
-          <a:prstGeom prst="rect">
-            <a:avLst/>
-          </a:prstGeom>
-          <a:solidFill>
-            <a:srgbClr val="1E293B"/>
-          </a:solidFill>
-          <a:ln>
-            <a:noFill/>
-          </a:ln>
-          <a:effectLst/>
-        </p:spPr>
-        <p:style>
-          <a:lnRef idx="1">
-            <a:schemeClr val="accent1"/>
-          </a:lnRef>
-          <a:fillRef idx="3">
-            <a:schemeClr val="accent1"/>
-          </a:fillRef>
-          <a:effectRef idx="2">
-            <a:schemeClr val="accent1"/>
-          </a:effectRef>
-          <a:fontRef idx="minor">
-            <a:schemeClr val="lt1"/>
-          </a:fontRef>
-        </p:style>
-        <p:txBody>
-          <a:bodyPr rtlCol="0" anchor="ctr"/>
-          <a:lstStyle/>
-          <a:p>
-            <a:pPr algn="ctr"/>
-          </a:p>
-        </p:txBody>
-      </p:sp>
-      <p:sp>
-        <p:nvSpPr>
-          <p:cNvPr id="10" name="TextBox 9"/>
-          <p:cNvSpPr txBox="1"/>
-          <p:nvPr/>
-        </p:nvSpPr>
-        <p:spPr>
-          <a:xfrm>
-            <a:off x="2103120" y="4480560"/>
-            <a:ext cx="7955279" cy="548640"/>
-          </a:xfrm>
-          <a:prstGeom prst="rect">
-            <a:avLst/>
-          </a:prstGeom>
-          <a:noFill/>
-        </p:spPr>
-        <p:txBody>
-          <a:bodyPr wrap="square">
-            <a:spAutoFit/>
-          </a:bodyPr>
-          <a:lstStyle/>
-          <a:p>
-            <a:pPr algn="l">
-              <a:defRPr sz="1600" b="0">
-                <a:solidFill>
-                  <a:srgbClr val="FFFFFF"/>
-                </a:solidFill>
-              </a:defRPr>
-            </a:pPr>
-            <a:r>
-              <a:t>📄 Docs &amp; Slides  -  github.com/EasonC13-agent/lulu-ai-firewall-sui-hackathon</a:t>
-            </a:r>
-          </a:p>
-        </p:txBody>
-      </p:sp>
-      <p:sp>
-        <p:nvSpPr>
-          <p:cNvPr id="11" name="TextBox 10"/>
-          <p:cNvSpPr txBox="1"/>
-          <p:nvPr/>
-        </p:nvSpPr>
-        <p:spPr>
-          <a:xfrm>
-            <a:off x="0" y="5669280"/>
-            <a:ext cx="12191695" cy="365760"/>
-          </a:xfrm>
-          <a:prstGeom prst="rect">
-            <a:avLst/>
-          </a:prstGeom>
-          <a:noFill/>
-        </p:spPr>
-        <p:txBody>
-          <a:bodyPr wrap="square">
-            <a:spAutoFit/>
-          </a:bodyPr>
-          <a:lstStyle/>
-          <a:p>
             <a:pPr algn="ctr">
-              <a:defRPr sz="1600" b="0">
-                <a:solidFill>
-                  <a:srgbClr val="34D399"/>
-                </a:solidFill>
-              </a:defRPr>
-            </a:pPr>
-            <a:r>
-              <a:t>Open Source  ·  Sui Testnet  ·  42 Tests / 100% Coverage</a:t>
+              <a:defRPr sz="4800" b="0">
+                <a:solidFill>
+                  <a:srgbClr val="FFFFFF"/>
+                </a:solidFill>
+              </a:defRPr>
+            </a:pPr>
+            <a:r>
+              <a:t>💰</a:t>
+            </a:r>
+          </a:p>
+          <a:p>
+            <a:pPr algn="ctr">
+              <a:defRPr sz="2200" b="1">
+                <a:solidFill>
+                  <a:srgbClr val="60A5FA"/>
+                </a:solidFill>
+              </a:defRPr>
+            </a:pPr>
+            <a:r>
+              <a:t>3mate Platform</a:t>
+            </a:r>
+          </a:p>
+          <a:p>
+            <a:pPr algn="l">
+              <a:defRPr sz="1000" b="0">
+                <a:solidFill>
+                  <a:srgbClr val="FFFFFF"/>
+                </a:solidFill>
+              </a:defRPr>
+            </a:pPr>
+          </a:p>
+          <a:p>
+            <a:pPr algn="ctr">
+              <a:defRPr sz="1400" b="0">
+                <a:solidFill>
+                  <a:srgbClr val="FFFFFF"/>
+                </a:solidFill>
+              </a:defRPr>
+            </a:pPr>
+            <a:r>
+              <a:t>Connect wallet → Mint USDC →</a:t>
+            </a:r>
+          </a:p>
+          <a:p>
+            <a:pPr algn="ctr">
+              <a:defRPr sz="1400" b="0">
+                <a:solidFill>
+                  <a:srgbClr val="FFFFFF"/>
+                </a:solidFill>
+              </a:defRPr>
+            </a:pPr>
+            <a:r>
+              <a:t>Open Tunnel → Create API Key → Use</a:t>
+            </a:r>
+          </a:p>
+          <a:p>
+            <a:pPr algn="l">
+              <a:defRPr sz="1000" b="0">
+                <a:solidFill>
+                  <a:srgbClr val="FFFFFF"/>
+                </a:solidFill>
+              </a:defRPr>
+            </a:pPr>
+          </a:p>
+          <a:p>
+            <a:pPr algn="ctr">
+              <a:defRPr sz="1400" b="0">
+                <a:solidFill>
+                  <a:srgbClr val="60A5FA"/>
+                </a:solidFill>
+              </a:defRPr>
+            </a:pPr>
+            <a:r>
+              <a:t>platform.3mate.io</a:t>
             </a:r>
           </a:p>
         </p:txBody>
@@ -4079,6 +3849,418 @@
         </p:nvSpPr>
         <p:spPr>
           <a:xfrm>
+            <a:off x="0" y="274320"/>
+            <a:ext cx="12191695" cy="548640"/>
+          </a:xfrm>
+          <a:prstGeom prst="rect">
+            <a:avLst/>
+          </a:prstGeom>
+          <a:noFill/>
+        </p:spPr>
+        <p:txBody>
+          <a:bodyPr wrap="square">
+            <a:spAutoFit/>
+          </a:bodyPr>
+          <a:lstStyle/>
+          <a:p>
+            <a:pPr algn="ctr">
+              <a:defRPr sz="3600" b="1">
+                <a:solidFill>
+                  <a:srgbClr val="FFFFFF"/>
+                </a:solidFill>
+              </a:defRPr>
+            </a:pPr>
+            <a:r>
+              <a:t>Repositories</a:t>
+            </a:r>
+          </a:p>
+        </p:txBody>
+      </p:sp>
+      <p:sp>
+        <p:nvSpPr>
+          <p:cNvPr id="3" name="Rectangle 2"/>
+          <p:cNvSpPr/>
+          <p:nvPr/>
+        </p:nvSpPr>
+        <p:spPr>
+          <a:xfrm>
+            <a:off x="1828800" y="1371600"/>
+            <a:ext cx="8534095" cy="731520"/>
+          </a:xfrm>
+          <a:prstGeom prst="rect">
+            <a:avLst/>
+          </a:prstGeom>
+          <a:solidFill>
+            <a:srgbClr val="1E293B"/>
+          </a:solidFill>
+          <a:ln>
+            <a:noFill/>
+          </a:ln>
+          <a:effectLst/>
+        </p:spPr>
+        <p:style>
+          <a:lnRef idx="1">
+            <a:schemeClr val="accent1"/>
+          </a:lnRef>
+          <a:fillRef idx="3">
+            <a:schemeClr val="accent1"/>
+          </a:fillRef>
+          <a:effectRef idx="2">
+            <a:schemeClr val="accent1"/>
+          </a:effectRef>
+          <a:fontRef idx="minor">
+            <a:schemeClr val="lt1"/>
+          </a:fontRef>
+        </p:style>
+        <p:txBody>
+          <a:bodyPr rtlCol="0" anchor="ctr"/>
+          <a:lstStyle/>
+          <a:p>
+            <a:pPr algn="ctr"/>
+          </a:p>
+        </p:txBody>
+      </p:sp>
+      <p:sp>
+        <p:nvSpPr>
+          <p:cNvPr id="4" name="TextBox 3"/>
+          <p:cNvSpPr txBox="1"/>
+          <p:nvPr/>
+        </p:nvSpPr>
+        <p:spPr>
+          <a:xfrm>
+            <a:off x="2103120" y="1463040"/>
+            <a:ext cx="7955279" cy="548640"/>
+          </a:xfrm>
+          <a:prstGeom prst="rect">
+            <a:avLst/>
+          </a:prstGeom>
+          <a:noFill/>
+        </p:spPr>
+        <p:txBody>
+          <a:bodyPr wrap="square">
+            <a:spAutoFit/>
+          </a:bodyPr>
+          <a:lstStyle/>
+          <a:p>
+            <a:pPr algn="l">
+              <a:defRPr sz="1600" b="0">
+                <a:solidFill>
+                  <a:srgbClr val="FFFFFF"/>
+                </a:solidFill>
+              </a:defRPr>
+            </a:pPr>
+            <a:r>
+              <a:t>🤖 AI Agent Skill  -  github.com/EasonC13-agent/lulu-monitor</a:t>
+            </a:r>
+          </a:p>
+        </p:txBody>
+      </p:sp>
+      <p:sp>
+        <p:nvSpPr>
+          <p:cNvPr id="5" name="Rectangle 4"/>
+          <p:cNvSpPr/>
+          <p:nvPr/>
+        </p:nvSpPr>
+        <p:spPr>
+          <a:xfrm>
+            <a:off x="1828800" y="2377440"/>
+            <a:ext cx="8534095" cy="731520"/>
+          </a:xfrm>
+          <a:prstGeom prst="rect">
+            <a:avLst/>
+          </a:prstGeom>
+          <a:solidFill>
+            <a:srgbClr val="1E293B"/>
+          </a:solidFill>
+          <a:ln>
+            <a:noFill/>
+          </a:ln>
+          <a:effectLst/>
+        </p:spPr>
+        <p:style>
+          <a:lnRef idx="1">
+            <a:schemeClr val="accent1"/>
+          </a:lnRef>
+          <a:fillRef idx="3">
+            <a:schemeClr val="accent1"/>
+          </a:fillRef>
+          <a:effectRef idx="2">
+            <a:schemeClr val="accent1"/>
+          </a:effectRef>
+          <a:fontRef idx="minor">
+            <a:schemeClr val="lt1"/>
+          </a:fontRef>
+        </p:style>
+        <p:txBody>
+          <a:bodyPr rtlCol="0" anchor="ctr"/>
+          <a:lstStyle/>
+          <a:p>
+            <a:pPr algn="ctr"/>
+          </a:p>
+        </p:txBody>
+      </p:sp>
+      <p:sp>
+        <p:nvSpPr>
+          <p:cNvPr id="6" name="TextBox 5"/>
+          <p:cNvSpPr txBox="1"/>
+          <p:nvPr/>
+        </p:nvSpPr>
+        <p:spPr>
+          <a:xfrm>
+            <a:off x="2103120" y="2468880"/>
+            <a:ext cx="7955279" cy="548640"/>
+          </a:xfrm>
+          <a:prstGeom prst="rect">
+            <a:avLst/>
+          </a:prstGeom>
+          <a:noFill/>
+        </p:spPr>
+        <p:txBody>
+          <a:bodyPr wrap="square">
+            <a:spAutoFit/>
+          </a:bodyPr>
+          <a:lstStyle/>
+          <a:p>
+            <a:pPr algn="l">
+              <a:defRPr sz="1600" b="0">
+                <a:solidFill>
+                  <a:srgbClr val="FFFFFF"/>
+                </a:solidFill>
+              </a:defRPr>
+            </a:pPr>
+            <a:r>
+              <a:t>🖥️ Mac App  -  github.com/EasonC13-agent/LuLuAICompanion</a:t>
+            </a:r>
+          </a:p>
+        </p:txBody>
+      </p:sp>
+      <p:sp>
+        <p:nvSpPr>
+          <p:cNvPr id="7" name="Rectangle 6"/>
+          <p:cNvSpPr/>
+          <p:nvPr/>
+        </p:nvSpPr>
+        <p:spPr>
+          <a:xfrm>
+            <a:off x="1828800" y="3383280"/>
+            <a:ext cx="8534095" cy="731520"/>
+          </a:xfrm>
+          <a:prstGeom prst="rect">
+            <a:avLst/>
+          </a:prstGeom>
+          <a:solidFill>
+            <a:srgbClr val="1E293B"/>
+          </a:solidFill>
+          <a:ln>
+            <a:noFill/>
+          </a:ln>
+          <a:effectLst/>
+        </p:spPr>
+        <p:style>
+          <a:lnRef idx="1">
+            <a:schemeClr val="accent1"/>
+          </a:lnRef>
+          <a:fillRef idx="3">
+            <a:schemeClr val="accent1"/>
+          </a:fillRef>
+          <a:effectRef idx="2">
+            <a:schemeClr val="accent1"/>
+          </a:effectRef>
+          <a:fontRef idx="minor">
+            <a:schemeClr val="lt1"/>
+          </a:fontRef>
+        </p:style>
+        <p:txBody>
+          <a:bodyPr rtlCol="0" anchor="ctr"/>
+          <a:lstStyle/>
+          <a:p>
+            <a:pPr algn="ctr"/>
+          </a:p>
+        </p:txBody>
+      </p:sp>
+      <p:sp>
+        <p:nvSpPr>
+          <p:cNvPr id="8" name="TextBox 7"/>
+          <p:cNvSpPr txBox="1"/>
+          <p:nvPr/>
+        </p:nvSpPr>
+        <p:spPr>
+          <a:xfrm>
+            <a:off x="2103120" y="3474720"/>
+            <a:ext cx="7955279" cy="548640"/>
+          </a:xfrm>
+          <a:prstGeom prst="rect">
+            <a:avLst/>
+          </a:prstGeom>
+          <a:noFill/>
+        </p:spPr>
+        <p:txBody>
+          <a:bodyPr wrap="square">
+            <a:spAutoFit/>
+          </a:bodyPr>
+          <a:lstStyle/>
+          <a:p>
+            <a:pPr algn="l">
+              <a:defRPr sz="1600" b="0">
+                <a:solidFill>
+                  <a:srgbClr val="FFFFFF"/>
+                </a:solidFill>
+              </a:defRPr>
+            </a:pPr>
+            <a:r>
+              <a:t>💰 3mate Platform  -  github.com/EasonC13-agent/platform.3mate.io</a:t>
+            </a:r>
+          </a:p>
+        </p:txBody>
+      </p:sp>
+      <p:sp>
+        <p:nvSpPr>
+          <p:cNvPr id="9" name="Rectangle 8"/>
+          <p:cNvSpPr/>
+          <p:nvPr/>
+        </p:nvSpPr>
+        <p:spPr>
+          <a:xfrm>
+            <a:off x="1828800" y="4389120"/>
+            <a:ext cx="8534095" cy="731520"/>
+          </a:xfrm>
+          <a:prstGeom prst="rect">
+            <a:avLst/>
+          </a:prstGeom>
+          <a:solidFill>
+            <a:srgbClr val="1E293B"/>
+          </a:solidFill>
+          <a:ln>
+            <a:noFill/>
+          </a:ln>
+          <a:effectLst/>
+        </p:spPr>
+        <p:style>
+          <a:lnRef idx="1">
+            <a:schemeClr val="accent1"/>
+          </a:lnRef>
+          <a:fillRef idx="3">
+            <a:schemeClr val="accent1"/>
+          </a:fillRef>
+          <a:effectRef idx="2">
+            <a:schemeClr val="accent1"/>
+          </a:effectRef>
+          <a:fontRef idx="minor">
+            <a:schemeClr val="lt1"/>
+          </a:fontRef>
+        </p:style>
+        <p:txBody>
+          <a:bodyPr rtlCol="0" anchor="ctr"/>
+          <a:lstStyle/>
+          <a:p>
+            <a:pPr algn="ctr"/>
+          </a:p>
+        </p:txBody>
+      </p:sp>
+      <p:sp>
+        <p:nvSpPr>
+          <p:cNvPr id="10" name="TextBox 9"/>
+          <p:cNvSpPr txBox="1"/>
+          <p:nvPr/>
+        </p:nvSpPr>
+        <p:spPr>
+          <a:xfrm>
+            <a:off x="2103120" y="4480560"/>
+            <a:ext cx="7955279" cy="548640"/>
+          </a:xfrm>
+          <a:prstGeom prst="rect">
+            <a:avLst/>
+          </a:prstGeom>
+          <a:noFill/>
+        </p:spPr>
+        <p:txBody>
+          <a:bodyPr wrap="square">
+            <a:spAutoFit/>
+          </a:bodyPr>
+          <a:lstStyle/>
+          <a:p>
+            <a:pPr algn="l">
+              <a:defRPr sz="1600" b="0">
+                <a:solidFill>
+                  <a:srgbClr val="FFFFFF"/>
+                </a:solidFill>
+              </a:defRPr>
+            </a:pPr>
+            <a:r>
+              <a:t>📄 Docs &amp; Slides  -  github.com/EasonC13-agent/lulu-ai-firewall-sui-hackathon</a:t>
+            </a:r>
+          </a:p>
+        </p:txBody>
+      </p:sp>
+      <p:sp>
+        <p:nvSpPr>
+          <p:cNvPr id="11" name="TextBox 10"/>
+          <p:cNvSpPr txBox="1"/>
+          <p:nvPr/>
+        </p:nvSpPr>
+        <p:spPr>
+          <a:xfrm>
+            <a:off x="0" y="5669280"/>
+            <a:ext cx="12191695" cy="365760"/>
+          </a:xfrm>
+          <a:prstGeom prst="rect">
+            <a:avLst/>
+          </a:prstGeom>
+          <a:noFill/>
+        </p:spPr>
+        <p:txBody>
+          <a:bodyPr wrap="square">
+            <a:spAutoFit/>
+          </a:bodyPr>
+          <a:lstStyle/>
+          <a:p>
+            <a:pPr algn="ctr">
+              <a:defRPr sz="1600" b="0">
+                <a:solidFill>
+                  <a:srgbClr val="34D399"/>
+                </a:solidFill>
+              </a:defRPr>
+            </a:pPr>
+            <a:r>
+              <a:t>Open Source  ·  Sui Testnet  ·  42 Tests / 100% Coverage</a:t>
+            </a:r>
+          </a:p>
+        </p:txBody>
+      </p:sp>
+    </p:spTree>
+  </p:cSld>
+  <p:clrMapOvr>
+    <a:masterClrMapping/>
+  </p:clrMapOvr>
+</p:sld>
+</file>
+
+<file path=ppt/slides/slide13.xml><?xml version="1.0" encoding="utf-8"?>
+<p:sld xmlns:a="http://schemas.openxmlformats.org/drawingml/2006/main" xmlns:p="http://schemas.openxmlformats.org/presentationml/2006/main" xmlns:r="http://schemas.openxmlformats.org/officeDocument/2006/relationships">
+  <p:cSld>
+    <p:bg>
+      <p:bgPr>
+        <a:solidFill>
+          <a:srgbClr val="0F172A"/>
+        </a:solidFill>
+        <a:effectLst/>
+      </p:bgPr>
+    </p:bg>
+    <p:spTree>
+      <p:nvGrpSpPr>
+        <p:cNvPr id="1" name=""/>
+        <p:cNvGrpSpPr/>
+        <p:nvPr/>
+      </p:nvGrpSpPr>
+      <p:grpSpPr/>
+      <p:sp>
+        <p:nvSpPr>
+          <p:cNvPr id="2" name="TextBox 1"/>
+          <p:cNvSpPr txBox="1"/>
+          <p:nvPr/>
+        </p:nvSpPr>
+        <p:spPr>
+          <a:xfrm>
             <a:off x="0" y="1371600"/>
             <a:ext cx="12191695" cy="914400"/>
           </a:xfrm>
@@ -6114,25 +6296,49 @@
             <a:pPr algn="ctr">
               <a:defRPr sz="3600" b="1">
                 <a:solidFill>
-                  <a:srgbClr val="60A5FA"/>
-                </a:solidFill>
-              </a:defRPr>
-            </a:pPr>
-            <a:r>
-              <a:t>Sui Tunnel Payment</a:t>
-            </a:r>
-          </a:p>
-        </p:txBody>
-      </p:sp>
-      <p:sp>
-        <p:nvSpPr>
-          <p:cNvPr id="3" name="TextBox 2"/>
+                  <a:srgbClr val="FFFFFF"/>
+                </a:solidFill>
+              </a:defRPr>
+            </a:pPr>
+            <a:r>
+              <a:t>LuLu AI Companion in Action</a:t>
+            </a:r>
+          </a:p>
+        </p:txBody>
+      </p:sp>
+      <p:pic>
+        <p:nvPicPr>
+          <p:cNvPr id="3" name="Picture 2" descr="companion-desktop.png"/>
+          <p:cNvPicPr>
+            <a:picLocks noChangeAspect="1"/>
+          </p:cNvPicPr>
+          <p:nvPr/>
+        </p:nvPicPr>
+        <p:blipFill>
+          <a:blip r:embed="rId2"/>
+          <a:stretch>
+            <a:fillRect/>
+          </a:stretch>
+        </p:blipFill>
+        <p:spPr>
+          <a:xfrm>
+            <a:off x="2286000" y="1097280"/>
+            <a:ext cx="7615003" cy="4572000"/>
+          </a:xfrm>
+          <a:prstGeom prst="rect">
+            <a:avLst/>
+          </a:prstGeom>
+        </p:spPr>
+      </p:pic>
+      <p:sp>
+        <p:nvSpPr>
+          <p:cNvPr id="4" name="TextBox 3"/>
           <p:cNvSpPr txBox="1"/>
           <p:nvPr/>
         </p:nvSpPr>
         <p:spPr>
           <a:xfrm>
-            <a:off x="0" y="822960"/>
+            <a:off x="0" y="5943600"/>
             <a:ext cx="12191695" cy="365760"/>
           </a:xfrm>
           <a:prstGeom prst="rect">
@@ -6147,303 +6353,14 @@
           <a:lstStyle/>
           <a:p>
             <a:pPr algn="ctr">
-              <a:defRPr sz="1800" b="0">
+              <a:defRPr sz="1400" b="0">
                 <a:solidFill>
                   <a:srgbClr val="94A3B8"/>
                 </a:solidFill>
               </a:defRPr>
             </a:pPr>
             <a:r>
-              <a:t>Pay-per-use AI via on-chain micropayments</a:t>
-            </a:r>
-          </a:p>
-        </p:txBody>
-      </p:sp>
-      <p:sp>
-        <p:nvSpPr>
-          <p:cNvPr id="4" name="TextBox 3"/>
-          <p:cNvSpPr txBox="1"/>
-          <p:nvPr/>
-        </p:nvSpPr>
-        <p:spPr>
-          <a:xfrm>
-            <a:off x="0" y="1463040"/>
-            <a:ext cx="12191695" cy="731520"/>
-          </a:xfrm>
-          <a:prstGeom prst="rect">
-            <a:avLst/>
-          </a:prstGeom>
-          <a:noFill/>
-        </p:spPr>
-        <p:txBody>
-          <a:bodyPr wrap="square">
-            <a:spAutoFit/>
-          </a:bodyPr>
-          <a:lstStyle/>
-          <a:p>
-            <a:pPr algn="ctr">
-              <a:defRPr sz="1800" b="0">
-                <a:solidFill>
-                  <a:srgbClr val="60A5FA"/>
-                </a:solidFill>
-              </a:defRPr>
-            </a:pPr>
-            <a:r>
-              <a:t>💰 Deposit USDC  →  🔑 Create API Key  →  🤖 Use AI  →  ✅ Claim  →  💸 Close/Refund</a:t>
-            </a:r>
-          </a:p>
-        </p:txBody>
-      </p:sp>
-      <p:sp>
-        <p:nvSpPr>
-          <p:cNvPr id="5" name="Rectangle 4"/>
-          <p:cNvSpPr/>
-          <p:nvPr/>
-        </p:nvSpPr>
-        <p:spPr>
-          <a:xfrm>
-            <a:off x="731520" y="2560320"/>
-            <a:ext cx="5029200" cy="2926080"/>
-          </a:xfrm>
-          <a:prstGeom prst="rect">
-            <a:avLst/>
-          </a:prstGeom>
-          <a:solidFill>
-            <a:srgbClr val="1E293B"/>
-          </a:solidFill>
-          <a:ln>
-            <a:noFill/>
-          </a:ln>
-          <a:effectLst/>
-        </p:spPr>
-        <p:style>
-          <a:lnRef idx="1">
-            <a:schemeClr val="accent1"/>
-          </a:lnRef>
-          <a:fillRef idx="3">
-            <a:schemeClr val="accent1"/>
-          </a:fillRef>
-          <a:effectRef idx="2">
-            <a:schemeClr val="accent1"/>
-          </a:effectRef>
-          <a:fontRef idx="minor">
-            <a:schemeClr val="lt1"/>
-          </a:fontRef>
-        </p:style>
-        <p:txBody>
-          <a:bodyPr rtlCol="0" anchor="ctr"/>
-          <a:lstStyle/>
-          <a:p>
-            <a:pPr algn="ctr"/>
-          </a:p>
-        </p:txBody>
-      </p:sp>
-      <p:sp>
-        <p:nvSpPr>
-          <p:cNvPr id="6" name="TextBox 5"/>
-          <p:cNvSpPr txBox="1"/>
-          <p:nvPr/>
-        </p:nvSpPr>
-        <p:spPr>
-          <a:xfrm>
-            <a:off x="914400" y="2651760"/>
-            <a:ext cx="4663440" cy="365760"/>
-          </a:xfrm>
-          <a:prstGeom prst="rect">
-            <a:avLst/>
-          </a:prstGeom>
-          <a:noFill/>
-        </p:spPr>
-        <p:txBody>
-          <a:bodyPr wrap="square">
-            <a:spAutoFit/>
-          </a:bodyPr>
-          <a:lstStyle/>
-          <a:p>
-            <a:pPr algn="l">
-              <a:defRPr sz="2200" b="1">
-                <a:solidFill>
-                  <a:srgbClr val="60A5FA"/>
-                </a:solidFill>
-              </a:defRPr>
-            </a:pPr>
-            <a:r>
-              <a:t>Why Sui?</a:t>
-            </a:r>
-          </a:p>
-          <a:p>
-            <a:pPr algn="l">
-              <a:defRPr sz="1600" b="0">
-                <a:solidFill>
-                  <a:srgbClr val="FFFFFF"/>
-                </a:solidFill>
-              </a:defRPr>
-            </a:pPr>
-            <a:r>
-              <a:t>• Sub-second finality for real-time payments</a:t>
-            </a:r>
-          </a:p>
-          <a:p>
-            <a:pPr algn="l">
-              <a:defRPr sz="1600" b="0">
-                <a:solidFill>
-                  <a:srgbClr val="FFFFFF"/>
-                </a:solidFill>
-              </a:defRPr>
-            </a:pPr>
-            <a:r>
-              <a:t>• Shared objects = perfect for payment channels</a:t>
-            </a:r>
-          </a:p>
-          <a:p>
-            <a:pPr algn="l">
-              <a:defRPr sz="1600" b="0">
-                <a:solidFill>
-                  <a:srgbClr val="FFFFFF"/>
-                </a:solidFill>
-              </a:defRPr>
-            </a:pPr>
-            <a:r>
-              <a:t>• Gas Station = zero gas for end users</a:t>
-            </a:r>
-          </a:p>
-          <a:p>
-            <a:pPr algn="l">
-              <a:defRPr sz="1600" b="0">
-                <a:solidFill>
-                  <a:srgbClr val="FFFFFF"/>
-                </a:solidFill>
-              </a:defRPr>
-            </a:pPr>
-            <a:r>
-              <a:t>• Ed25519 native support in Move</a:t>
-            </a:r>
-          </a:p>
-        </p:txBody>
-      </p:sp>
-      <p:sp>
-        <p:nvSpPr>
-          <p:cNvPr id="7" name="Rectangle 6"/>
-          <p:cNvSpPr/>
-          <p:nvPr/>
-        </p:nvSpPr>
-        <p:spPr>
-          <a:xfrm>
-            <a:off x="6400800" y="2560320"/>
-            <a:ext cx="5029200" cy="2926080"/>
-          </a:xfrm>
-          <a:prstGeom prst="rect">
-            <a:avLst/>
-          </a:prstGeom>
-          <a:solidFill>
-            <a:srgbClr val="1E293B"/>
-          </a:solidFill>
-          <a:ln>
-            <a:noFill/>
-          </a:ln>
-          <a:effectLst/>
-        </p:spPr>
-        <p:style>
-          <a:lnRef idx="1">
-            <a:schemeClr val="accent1"/>
-          </a:lnRef>
-          <a:fillRef idx="3">
-            <a:schemeClr val="accent1"/>
-          </a:fillRef>
-          <a:effectRef idx="2">
-            <a:schemeClr val="accent1"/>
-          </a:effectRef>
-          <a:fontRef idx="minor">
-            <a:schemeClr val="lt1"/>
-          </a:fontRef>
-        </p:style>
-        <p:txBody>
-          <a:bodyPr rtlCol="0" anchor="ctr"/>
-          <a:lstStyle/>
-          <a:p>
-            <a:pPr algn="ctr"/>
-          </a:p>
-        </p:txBody>
-      </p:sp>
-      <p:sp>
-        <p:nvSpPr>
-          <p:cNvPr id="8" name="TextBox 7"/>
-          <p:cNvSpPr txBox="1"/>
-          <p:nvPr/>
-        </p:nvSpPr>
-        <p:spPr>
-          <a:xfrm>
-            <a:off x="6583680" y="2651760"/>
-            <a:ext cx="4663440" cy="365760"/>
-          </a:xfrm>
-          <a:prstGeom prst="rect">
-            <a:avLst/>
-          </a:prstGeom>
-          <a:noFill/>
-        </p:spPr>
-        <p:txBody>
-          <a:bodyPr wrap="square">
-            <a:spAutoFit/>
-          </a:bodyPr>
-          <a:lstStyle/>
-          <a:p>
-            <a:pPr algn="l">
-              <a:defRPr sz="2200" b="1">
-                <a:solidFill>
-                  <a:srgbClr val="34D399"/>
-                </a:solidFill>
-              </a:defRPr>
-            </a:pPr>
-            <a:r>
-              <a:t>Contract Security</a:t>
-            </a:r>
-          </a:p>
-          <a:p>
-            <a:pPr algn="l">
-              <a:defRPr sz="1600" b="0">
-                <a:solidFill>
-                  <a:srgbClr val="34D399"/>
-                </a:solidFill>
-              </a:defRPr>
-            </a:pPr>
-            <a:r>
-              <a:t>• 42 tests, 100% coverage</a:t>
-            </a:r>
-          </a:p>
-          <a:p>
-            <a:pPr algn="l">
-              <a:defRPr sz="1600" b="0">
-                <a:solidFill>
-                  <a:srgbClr val="FFFFFF"/>
-                </a:solidFill>
-              </a:defRPr>
-            </a:pPr>
-            <a:r>
-              <a:t>• Multi-key: 1 deposit, N API keys</a:t>
-            </a:r>
-          </a:p>
-          <a:p>
-            <a:pPr algn="l">
-              <a:defRPr sz="1600" b="0">
-                <a:solidFill>
-                  <a:srgbClr val="FFFFFF"/>
-                </a:solidFill>
-              </a:defRPr>
-            </a:pPr>
-            <a:r>
-              <a:t>• Grace period prevents operator abuse</a:t>
-            </a:r>
-          </a:p>
-          <a:p>
-            <a:pPr algn="l">
-              <a:defRPr sz="1600" b="0">
-                <a:solidFill>
-                  <a:srgbClr val="FFFFFF"/>
-                </a:solidFill>
-              </a:defRPr>
-            </a:pPr>
-            <a:r>
-              <a:t>• User can always close and get refund</a:t>
+              <a:t>AI recommendation overlay next to LuLu firewall alert on macOS</a:t>
             </a:r>
           </a:p>
         </p:txBody>
@@ -6499,12 +6416,12 @@
             <a:pPr algn="ctr">
               <a:defRPr sz="3600" b="1">
                 <a:solidFill>
-                  <a:srgbClr val="FFFFFF"/>
-                </a:solidFill>
-              </a:defRPr>
-            </a:pPr>
-            <a:r>
-              <a:t>Architecture</a:t>
+                  <a:srgbClr val="60A5FA"/>
+                </a:solidFill>
+              </a:defRPr>
+            </a:pPr>
+            <a:r>
+              <a:t>Sui Tunnel Payment</a:t>
             </a:r>
           </a:p>
         </p:txBody>
@@ -6517,8 +6434,8 @@
         </p:nvSpPr>
         <p:spPr>
           <a:xfrm>
-            <a:off x="1828800" y="1097280"/>
-            <a:ext cx="8503920" cy="5029200"/>
+            <a:off x="0" y="822960"/>
+            <a:ext cx="12191695" cy="365760"/>
           </a:xfrm>
           <a:prstGeom prst="rect">
             <a:avLst/>
@@ -6531,100 +6448,304 @@
           </a:bodyPr>
           <a:lstStyle/>
           <a:p>
-            <a:pPr>
-              <a:defRPr sz="1100">
-                <a:solidFill>
-                  <a:srgbClr val="FFFFFF"/>
-                </a:solidFill>
-                <a:latin typeface="Courier New"/>
-              </a:defRPr>
-            </a:pPr>
-            <a:r>
-              <a:t>┌──────────────────────────────────────────────┐</a:t>
-            </a:r>
-            <a:br/>
-            <a:r>
-              <a:t>│                User's Mac                     │</a:t>
-            </a:r>
-            <a:br/>
-            <a:r>
-              <a:t>│                                               │</a:t>
-            </a:r>
-            <a:br/>
-            <a:r>
-              <a:t>│  ┌──────────┐    ┌─────────────────────────┐ │</a:t>
-            </a:r>
-            <a:br/>
-            <a:r>
-              <a:t>│  │  LuLu    │───→│  lulu-monitor (Skill)   │ │</a:t>
-            </a:r>
-            <a:br/>
-            <a:r>
-              <a:t>│  │ Firewall │    │  or LuLuAI (Mac App)    │ │</a:t>
-            </a:r>
-            <a:br/>
-            <a:r>
-              <a:t>│  └──────────┘    └────────────┬────────────┘ │</a:t>
-            </a:r>
-            <a:br/>
-            <a:r>
-              <a:t>└───────────────────────────────┼───────────────┘</a:t>
-            </a:r>
-            <a:br/>
-            <a:r>
-              <a:t>                                │ API Call (sk-3mate key)</a:t>
-            </a:r>
-            <a:br/>
-            <a:r>
-              <a:t>                 ┌──────────────▼──────────────┐</a:t>
-            </a:r>
-            <a:br/>
-            <a:r>
-              <a:t>                 │     3mate Platform            │</a:t>
-            </a:r>
-            <a:br/>
-            <a:r>
-              <a:t>                 │     platform.3mate.io         │</a:t>
-            </a:r>
-            <a:br/>
-            <a:r>
-              <a:t>                 │  ┌─────────┐  ┌───────────┐  │</a:t>
-            </a:r>
-            <a:br/>
-            <a:r>
-              <a:t>                 │  │ Claude  │  │ Sui Tunnel│  │</a:t>
-            </a:r>
-            <a:br/>
-            <a:r>
-              <a:t>                 │  │ Proxy   │  │ Payment   │  │</a:t>
-            </a:r>
-            <a:br/>
-            <a:r>
-              <a:t>                 │  └─────────┘  └───────────┘  │</a:t>
-            </a:r>
-            <a:br/>
-            <a:r>
-              <a:t>                 └──────────────┬───────────────┘</a:t>
-            </a:r>
-            <a:br/>
-            <a:r>
-              <a:t>                                │ On-chain claim</a:t>
-            </a:r>
-            <a:br/>
-            <a:r>
-              <a:t>                 ┌──────────────▼──────────────┐</a:t>
-            </a:r>
-            <a:br/>
-            <a:r>
-              <a:t>                 │       Sui Blockchain          │</a:t>
-            </a:r>
-            <a:br/>
-            <a:r>
-              <a:t>                 │  Tunnel + TEST_USDC + Ed25519 │</a:t>
-            </a:r>
-            <a:br/>
-            <a:r>
-              <a:t>                 └───────────────────────────────┘</a:t>
+            <a:pPr algn="ctr">
+              <a:defRPr sz="1800" b="0">
+                <a:solidFill>
+                  <a:srgbClr val="94A3B8"/>
+                </a:solidFill>
+              </a:defRPr>
+            </a:pPr>
+            <a:r>
+              <a:t>Pay-per-use AI via on-chain micropayments</a:t>
+            </a:r>
+          </a:p>
+        </p:txBody>
+      </p:sp>
+      <p:sp>
+        <p:nvSpPr>
+          <p:cNvPr id="4" name="TextBox 3"/>
+          <p:cNvSpPr txBox="1"/>
+          <p:nvPr/>
+        </p:nvSpPr>
+        <p:spPr>
+          <a:xfrm>
+            <a:off x="0" y="1463040"/>
+            <a:ext cx="12191695" cy="731520"/>
+          </a:xfrm>
+          <a:prstGeom prst="rect">
+            <a:avLst/>
+          </a:prstGeom>
+          <a:noFill/>
+        </p:spPr>
+        <p:txBody>
+          <a:bodyPr wrap="square">
+            <a:spAutoFit/>
+          </a:bodyPr>
+          <a:lstStyle/>
+          <a:p>
+            <a:pPr algn="ctr">
+              <a:defRPr sz="1800" b="0">
+                <a:solidFill>
+                  <a:srgbClr val="60A5FA"/>
+                </a:solidFill>
+              </a:defRPr>
+            </a:pPr>
+            <a:r>
+              <a:t>💰 Deposit USDC  →  🔑 Create API Key  →  🤖 Use AI  →  ✅ Claim  →  💸 Close/Refund</a:t>
+            </a:r>
+          </a:p>
+        </p:txBody>
+      </p:sp>
+      <p:sp>
+        <p:nvSpPr>
+          <p:cNvPr id="5" name="Rectangle 4"/>
+          <p:cNvSpPr/>
+          <p:nvPr/>
+        </p:nvSpPr>
+        <p:spPr>
+          <a:xfrm>
+            <a:off x="731520" y="2560320"/>
+            <a:ext cx="5029200" cy="2926080"/>
+          </a:xfrm>
+          <a:prstGeom prst="rect">
+            <a:avLst/>
+          </a:prstGeom>
+          <a:solidFill>
+            <a:srgbClr val="1E293B"/>
+          </a:solidFill>
+          <a:ln>
+            <a:noFill/>
+          </a:ln>
+          <a:effectLst/>
+        </p:spPr>
+        <p:style>
+          <a:lnRef idx="1">
+            <a:schemeClr val="accent1"/>
+          </a:lnRef>
+          <a:fillRef idx="3">
+            <a:schemeClr val="accent1"/>
+          </a:fillRef>
+          <a:effectRef idx="2">
+            <a:schemeClr val="accent1"/>
+          </a:effectRef>
+          <a:fontRef idx="minor">
+            <a:schemeClr val="lt1"/>
+          </a:fontRef>
+        </p:style>
+        <p:txBody>
+          <a:bodyPr rtlCol="0" anchor="ctr"/>
+          <a:lstStyle/>
+          <a:p>
+            <a:pPr algn="ctr"/>
+          </a:p>
+        </p:txBody>
+      </p:sp>
+      <p:sp>
+        <p:nvSpPr>
+          <p:cNvPr id="6" name="TextBox 5"/>
+          <p:cNvSpPr txBox="1"/>
+          <p:nvPr/>
+        </p:nvSpPr>
+        <p:spPr>
+          <a:xfrm>
+            <a:off x="914400" y="2651760"/>
+            <a:ext cx="4663440" cy="365760"/>
+          </a:xfrm>
+          <a:prstGeom prst="rect">
+            <a:avLst/>
+          </a:prstGeom>
+          <a:noFill/>
+        </p:spPr>
+        <p:txBody>
+          <a:bodyPr wrap="square">
+            <a:spAutoFit/>
+          </a:bodyPr>
+          <a:lstStyle/>
+          <a:p>
+            <a:pPr algn="l">
+              <a:defRPr sz="2200" b="1">
+                <a:solidFill>
+                  <a:srgbClr val="60A5FA"/>
+                </a:solidFill>
+              </a:defRPr>
+            </a:pPr>
+            <a:r>
+              <a:t>Why Sui?</a:t>
+            </a:r>
+          </a:p>
+          <a:p>
+            <a:pPr algn="l">
+              <a:defRPr sz="1600" b="0">
+                <a:solidFill>
+                  <a:srgbClr val="FFFFFF"/>
+                </a:solidFill>
+              </a:defRPr>
+            </a:pPr>
+            <a:r>
+              <a:t>• Sub-second finality for real-time payments</a:t>
+            </a:r>
+          </a:p>
+          <a:p>
+            <a:pPr algn="l">
+              <a:defRPr sz="1600" b="0">
+                <a:solidFill>
+                  <a:srgbClr val="FFFFFF"/>
+                </a:solidFill>
+              </a:defRPr>
+            </a:pPr>
+            <a:r>
+              <a:t>• Shared objects = perfect for payment channels</a:t>
+            </a:r>
+          </a:p>
+          <a:p>
+            <a:pPr algn="l">
+              <a:defRPr sz="1600" b="0">
+                <a:solidFill>
+                  <a:srgbClr val="FFFFFF"/>
+                </a:solidFill>
+              </a:defRPr>
+            </a:pPr>
+            <a:r>
+              <a:t>• Gas Station = zero gas for end users</a:t>
+            </a:r>
+          </a:p>
+          <a:p>
+            <a:pPr algn="l">
+              <a:defRPr sz="1600" b="0">
+                <a:solidFill>
+                  <a:srgbClr val="FFFFFF"/>
+                </a:solidFill>
+              </a:defRPr>
+            </a:pPr>
+            <a:r>
+              <a:t>• Ed25519 native support in Move</a:t>
+            </a:r>
+          </a:p>
+        </p:txBody>
+      </p:sp>
+      <p:sp>
+        <p:nvSpPr>
+          <p:cNvPr id="7" name="Rectangle 6"/>
+          <p:cNvSpPr/>
+          <p:nvPr/>
+        </p:nvSpPr>
+        <p:spPr>
+          <a:xfrm>
+            <a:off x="6400800" y="2560320"/>
+            <a:ext cx="5029200" cy="2926080"/>
+          </a:xfrm>
+          <a:prstGeom prst="rect">
+            <a:avLst/>
+          </a:prstGeom>
+          <a:solidFill>
+            <a:srgbClr val="1E293B"/>
+          </a:solidFill>
+          <a:ln>
+            <a:noFill/>
+          </a:ln>
+          <a:effectLst/>
+        </p:spPr>
+        <p:style>
+          <a:lnRef idx="1">
+            <a:schemeClr val="accent1"/>
+          </a:lnRef>
+          <a:fillRef idx="3">
+            <a:schemeClr val="accent1"/>
+          </a:fillRef>
+          <a:effectRef idx="2">
+            <a:schemeClr val="accent1"/>
+          </a:effectRef>
+          <a:fontRef idx="minor">
+            <a:schemeClr val="lt1"/>
+          </a:fontRef>
+        </p:style>
+        <p:txBody>
+          <a:bodyPr rtlCol="0" anchor="ctr"/>
+          <a:lstStyle/>
+          <a:p>
+            <a:pPr algn="ctr"/>
+          </a:p>
+        </p:txBody>
+      </p:sp>
+      <p:sp>
+        <p:nvSpPr>
+          <p:cNvPr id="8" name="TextBox 7"/>
+          <p:cNvSpPr txBox="1"/>
+          <p:nvPr/>
+        </p:nvSpPr>
+        <p:spPr>
+          <a:xfrm>
+            <a:off x="6583680" y="2651760"/>
+            <a:ext cx="4663440" cy="365760"/>
+          </a:xfrm>
+          <a:prstGeom prst="rect">
+            <a:avLst/>
+          </a:prstGeom>
+          <a:noFill/>
+        </p:spPr>
+        <p:txBody>
+          <a:bodyPr wrap="square">
+            <a:spAutoFit/>
+          </a:bodyPr>
+          <a:lstStyle/>
+          <a:p>
+            <a:pPr algn="l">
+              <a:defRPr sz="2200" b="1">
+                <a:solidFill>
+                  <a:srgbClr val="34D399"/>
+                </a:solidFill>
+              </a:defRPr>
+            </a:pPr>
+            <a:r>
+              <a:t>Contract Security</a:t>
+            </a:r>
+          </a:p>
+          <a:p>
+            <a:pPr algn="l">
+              <a:defRPr sz="1600" b="0">
+                <a:solidFill>
+                  <a:srgbClr val="34D399"/>
+                </a:solidFill>
+              </a:defRPr>
+            </a:pPr>
+            <a:r>
+              <a:t>• 42 tests, 100% coverage</a:t>
+            </a:r>
+          </a:p>
+          <a:p>
+            <a:pPr algn="l">
+              <a:defRPr sz="1600" b="0">
+                <a:solidFill>
+                  <a:srgbClr val="FFFFFF"/>
+                </a:solidFill>
+              </a:defRPr>
+            </a:pPr>
+            <a:r>
+              <a:t>• Multi-key: 1 deposit, N API keys</a:t>
+            </a:r>
+          </a:p>
+          <a:p>
+            <a:pPr algn="l">
+              <a:defRPr sz="1600" b="0">
+                <a:solidFill>
+                  <a:srgbClr val="FFFFFF"/>
+                </a:solidFill>
+              </a:defRPr>
+            </a:pPr>
+            <a:r>
+              <a:t>• Grace period prevents operator abuse</a:t>
+            </a:r>
+          </a:p>
+          <a:p>
+            <a:pPr algn="l">
+              <a:defRPr sz="1600" b="0">
+                <a:solidFill>
+                  <a:srgbClr val="FFFFFF"/>
+                </a:solidFill>
+              </a:defRPr>
+            </a:pPr>
+            <a:r>
+              <a:t>• User can always close and get refund</a:t>
             </a:r>
           </a:p>
         </p:txBody>

</xml_diff>

<commit_message>
Update Mac App slide: add AI analysis, multi-provider keys, history features
</commit_message>
<xml_diff>
--- a/docs/LuLuAI-Pitch.pptx
+++ b/docs/LuLuAI-Pitch.pptx
@@ -5943,7 +5943,7 @@
         <p:spPr>
           <a:xfrm>
             <a:off x="731520" y="1463040"/>
-            <a:ext cx="5029200" cy="4114800"/>
+            <a:ext cx="5029200" cy="4389120"/>
           </a:xfrm>
           <a:prstGeom prst="rect">
             <a:avLst/>
@@ -6013,7 +6013,7 @@
           </a:p>
           <a:p>
             <a:pPr algn="l">
-              <a:defRPr sz="1500" b="0">
+              <a:defRPr sz="1400" b="0">
                 <a:solidFill>
                   <a:srgbClr val="FFFFFF"/>
                 </a:solidFill>
@@ -6025,7 +6025,7 @@
           </a:p>
           <a:p>
             <a:pPr algn="l">
-              <a:defRPr sz="1500" b="0">
+              <a:defRPr sz="1400" b="0">
                 <a:solidFill>
                   <a:srgbClr val="FFFFFF"/>
                 </a:solidFill>
@@ -6037,7 +6037,7 @@
           </a:p>
           <a:p>
             <a:pPr algn="l">
-              <a:defRPr sz="1500" b="0">
+              <a:defRPr sz="1400" b="0">
                 <a:solidFill>
                   <a:srgbClr val="FFFFFF"/>
                 </a:solidFill>
@@ -6049,31 +6049,67 @@
           </a:p>
           <a:p>
             <a:pPr algn="l">
-              <a:defRPr sz="1500" b="0">
-                <a:solidFill>
-                  <a:srgbClr val="FFFFFF"/>
-                </a:solidFill>
-              </a:defRPr>
-            </a:pPr>
-            <a:r>
-              <a:t>• AI recommendation overlay</a:t>
-            </a:r>
-          </a:p>
-          <a:p>
-            <a:pPr algn="l">
-              <a:defRPr sz="1500" b="0">
-                <a:solidFill>
-                  <a:srgbClr val="FFFFFF"/>
-                </a:solidFill>
-              </a:defRPr>
-            </a:pPr>
-            <a:r>
-              <a:t>• One-click Allow/Block</a:t>
-            </a:r>
-          </a:p>
-          <a:p>
-            <a:pPr algn="l">
-              <a:defRPr sz="1500" b="0">
+              <a:defRPr sz="1400" b="0">
+                <a:solidFill>
+                  <a:srgbClr val="34D399"/>
+                </a:solidFill>
+              </a:defRPr>
+            </a:pPr>
+            <a:r>
+              <a:t>• AI-powered risk analysis with detailed explanation</a:t>
+            </a:r>
+          </a:p>
+          <a:p>
+            <a:pPr algn="l">
+              <a:defRPr sz="1400" b="0">
+                <a:solidFill>
+                  <a:srgbClr val="FFFFFF"/>
+                </a:solidFill>
+              </a:defRPr>
+            </a:pPr>
+            <a:r>
+              <a:t>• One-click Allow/Block with confidence score</a:t>
+            </a:r>
+          </a:p>
+          <a:p>
+            <a:pPr algn="l">
+              <a:defRPr sz="1400" b="0">
+                <a:solidFill>
+                  <a:srgbClr val="34D399"/>
+                </a:solidFill>
+              </a:defRPr>
+            </a:pPr>
+            <a:r>
+              <a:t>• Multi-provider API keys: Anthropic, OpenAI, Gemini, 3mate</a:t>
+            </a:r>
+          </a:p>
+          <a:p>
+            <a:pPr algn="l">
+              <a:defRPr sz="1400" b="0">
+                <a:solidFill>
+                  <a:srgbClr val="FFFFFF"/>
+                </a:solidFill>
+              </a:defRPr>
+            </a:pPr>
+            <a:r>
+              <a:t>• Automatic failover across providers</a:t>
+            </a:r>
+          </a:p>
+          <a:p>
+            <a:pPr algn="l">
+              <a:defRPr sz="1400" b="0">
+                <a:solidFill>
+                  <a:srgbClr val="34D399"/>
+                </a:solidFill>
+              </a:defRPr>
+            </a:pPr>
+            <a:r>
+              <a:t>• Decision history with full audit log</a:t>
+            </a:r>
+          </a:p>
+          <a:p>
+            <a:pPr algn="l">
+              <a:defRPr sz="1400" b="0">
                 <a:solidFill>
                   <a:srgbClr val="FFFFFF"/>
                 </a:solidFill>
@@ -6094,7 +6130,7 @@
         <p:spPr>
           <a:xfrm>
             <a:off x="6400800" y="1463040"/>
-            <a:ext cx="5029200" cy="4114800"/>
+            <a:ext cx="5029200" cy="4389120"/>
           </a:xfrm>
           <a:prstGeom prst="rect">
             <a:avLst/>
@@ -6180,7 +6216,7 @@
               </a:defRPr>
             </a:pPr>
             <a:r>
-              <a:t>                    Mac App    Agent Skill</a:t>
+              <a:t>                    Mac App      Agent Skill</a:t>
             </a:r>
           </a:p>
           <a:p>
@@ -6192,7 +6228,7 @@
               </a:defRPr>
             </a:pPr>
             <a:r>
-              <a:t>Setup:           Download      OpenClaw req'd</a:t>
+              <a:t>Setup:           Download        OpenClaw req'd</a:t>
             </a:r>
           </a:p>
           <a:p>
@@ -6204,7 +6240,7 @@
               </a:defRPr>
             </a:pPr>
             <a:r>
-              <a:t>Notify:          On-screen     Telegram/Discord</a:t>
+              <a:t>Notify:          On-screen       Telegram/Discord</a:t>
             </a:r>
           </a:p>
           <a:p>
@@ -6216,7 +6252,7 @@
               </a:defRPr>
             </a:pPr>
             <a:r>
-              <a:t>Remote:         ❌ Local        ✅ From phone</a:t>
+              <a:t>AI Analysis:  ✅ Full             ✅ Full</a:t>
             </a:r>
           </a:p>
           <a:p>
@@ -6228,7 +6264,7 @@
               </a:defRPr>
             </a:pPr>
             <a:r>
-              <a:t>Context:        Basic            Full AI context</a:t>
+              <a:t>API Keys:     ✅ Multi-provider  Via OpenClaw</a:t>
             </a:r>
           </a:p>
           <a:p>
@@ -6240,7 +6276,31 @@
               </a:defRPr>
             </a:pPr>
             <a:r>
-              <a:t>Auto:             ❌                ✅ Auto-execute</a:t>
+              <a:t>History:        ✅ Local log      ✅ Chat history</a:t>
+            </a:r>
+          </a:p>
+          <a:p>
+            <a:pPr algn="l">
+              <a:defRPr sz="1300" b="0">
+                <a:solidFill>
+                  <a:srgbClr val="FFFFFF"/>
+                </a:solidFill>
+              </a:defRPr>
+            </a:pPr>
+            <a:r>
+              <a:t>Remote:        ❌ Local           ✅ From phone</a:t>
+            </a:r>
+          </a:p>
+          <a:p>
+            <a:pPr algn="l">
+              <a:defRPr sz="1300" b="0">
+                <a:solidFill>
+                  <a:srgbClr val="FFFFFF"/>
+                </a:solidFill>
+              </a:defRPr>
+            </a:pPr>
+            <a:r>
+              <a:t>Auto:            ❌                  ✅ Auto-execute</a:t>
             </a:r>
           </a:p>
         </p:txBody>

</xml_diff>

<commit_message>
Mac App slide: remove comparison table, show 4 feature cards
</commit_message>
<xml_diff>
--- a/docs/LuLuAI-Pitch.pptx
+++ b/docs/LuLuAI-Pitch.pptx
@@ -5943,7 +5943,7 @@
         <p:spPr>
           <a:xfrm>
             <a:off x="731520" y="1463040"/>
-            <a:ext cx="5029200" cy="4389120"/>
+            <a:ext cx="5029200" cy="2011680"/>
           </a:xfrm>
           <a:prstGeom prst="rect">
             <a:avLst/>
@@ -6001,14 +6001,14 @@
           <a:lstStyle/>
           <a:p>
             <a:pPr algn="l">
-              <a:defRPr sz="2000" b="1">
+              <a:defRPr sz="1800" b="1">
                 <a:solidFill>
                   <a:srgbClr val="60A5FA"/>
                 </a:solidFill>
               </a:defRPr>
             </a:pPr>
             <a:r>
-              <a:t>Features</a:t>
+              <a:t>🧠 AI Analysis</a:t>
             </a:r>
           </a:p>
           <a:p>
@@ -6020,7 +6020,7 @@
               </a:defRPr>
             </a:pPr>
             <a:r>
-              <a:t>• Native SwiftUI menu bar app</a:t>
+              <a:t>• Full AI-powered risk analysis with explanation</a:t>
             </a:r>
           </a:p>
           <a:p>
@@ -6032,7 +6032,7 @@
               </a:defRPr>
             </a:pPr>
             <a:r>
-              <a:t>• Monitors alerts via Accessibility API</a:t>
+              <a:t>• WHOIS + Geo + DNS enrichment per connection</a:t>
             </a:r>
           </a:p>
           <a:p>
@@ -6044,79 +6044,19 @@
               </a:defRPr>
             </a:pPr>
             <a:r>
-              <a:t>• WHOIS + Geo + DNS enrichment</a:t>
+              <a:t>• Confidence score for every recommendation</a:t>
             </a:r>
           </a:p>
           <a:p>
             <a:pPr algn="l">
               <a:defRPr sz="1400" b="0">
                 <a:solidFill>
-                  <a:srgbClr val="34D399"/>
-                </a:solidFill>
-              </a:defRPr>
-            </a:pPr>
-            <a:r>
-              <a:t>• AI-powered risk analysis with detailed explanation</a:t>
-            </a:r>
-          </a:p>
-          <a:p>
-            <a:pPr algn="l">
-              <a:defRPr sz="1400" b="0">
-                <a:solidFill>
                   <a:srgbClr val="FFFFFF"/>
                 </a:solidFill>
               </a:defRPr>
             </a:pPr>
             <a:r>
-              <a:t>• One-click Allow/Block with confidence score</a:t>
-            </a:r>
-          </a:p>
-          <a:p>
-            <a:pPr algn="l">
-              <a:defRPr sz="1400" b="0">
-                <a:solidFill>
-                  <a:srgbClr val="34D399"/>
-                </a:solidFill>
-              </a:defRPr>
-            </a:pPr>
-            <a:r>
-              <a:t>• Multi-provider API keys: Anthropic, OpenAI, Gemini, 3mate</a:t>
-            </a:r>
-          </a:p>
-          <a:p>
-            <a:pPr algn="l">
-              <a:defRPr sz="1400" b="0">
-                <a:solidFill>
-                  <a:srgbClr val="FFFFFF"/>
-                </a:solidFill>
-              </a:defRPr>
-            </a:pPr>
-            <a:r>
-              <a:t>• Automatic failover across providers</a:t>
-            </a:r>
-          </a:p>
-          <a:p>
-            <a:pPr algn="l">
-              <a:defRPr sz="1400" b="0">
-                <a:solidFill>
-                  <a:srgbClr val="34D399"/>
-                </a:solidFill>
-              </a:defRPr>
-            </a:pPr>
-            <a:r>
-              <a:t>• Decision history with full audit log</a:t>
-            </a:r>
-          </a:p>
-          <a:p>
-            <a:pPr algn="l">
-              <a:defRPr sz="1400" b="0">
-                <a:solidFill>
-                  <a:srgbClr val="FFFFFF"/>
-                </a:solidFill>
-              </a:defRPr>
-            </a:pPr>
-            <a:r>
-              <a:t>• Setup wizard for easy config</a:t>
+              <a:t>• On-screen overlay + one-click Allow/Block</a:t>
             </a:r>
           </a:p>
         </p:txBody>
@@ -6130,7 +6070,7 @@
         <p:spPr>
           <a:xfrm>
             <a:off x="6400800" y="1463040"/>
-            <a:ext cx="5029200" cy="4389120"/>
+            <a:ext cx="5029200" cy="2011680"/>
           </a:xfrm>
           <a:prstGeom prst="rect">
             <a:avLst/>
@@ -6188,119 +6128,280 @@
           <a:lstStyle/>
           <a:p>
             <a:pPr algn="l">
-              <a:defRPr sz="2000" b="1">
+              <a:defRPr sz="1800" b="1">
                 <a:solidFill>
                   <a:srgbClr val="60A5FA"/>
                 </a:solidFill>
               </a:defRPr>
             </a:pPr>
             <a:r>
-              <a:t>Agent Skill vs Mac App</a:t>
-            </a:r>
-          </a:p>
-          <a:p>
-            <a:pPr algn="l">
-              <a:defRPr sz="1800" b="0">
+              <a:t>🔑 Multi-Provider API Keys</a:t>
+            </a:r>
+          </a:p>
+          <a:p>
+            <a:pPr algn="l">
+              <a:defRPr sz="1400" b="0">
+                <a:solidFill>
+                  <a:srgbClr val="34D399"/>
+                </a:solidFill>
+              </a:defRPr>
+            </a:pPr>
+            <a:r>
+              <a:t>• Supports Anthropic, OpenAI, Gemini, and 3mate</a:t>
+            </a:r>
+          </a:p>
+          <a:p>
+            <a:pPr algn="l">
+              <a:defRPr sz="1400" b="0">
                 <a:solidFill>
                   <a:srgbClr val="FFFFFF"/>
                 </a:solidFill>
               </a:defRPr>
             </a:pPr>
-          </a:p>
-          <a:p>
-            <a:pPr algn="l">
-              <a:defRPr sz="1300" b="0">
-                <a:solidFill>
-                  <a:srgbClr val="94A3B8"/>
-                </a:solidFill>
-              </a:defRPr>
-            </a:pPr>
-            <a:r>
-              <a:t>                    Mac App      Agent Skill</a:t>
-            </a:r>
-          </a:p>
-          <a:p>
-            <a:pPr algn="l">
-              <a:defRPr sz="1300" b="0">
+            <a:r>
+              <a:t>• Add multiple keys with automatic failover</a:t>
+            </a:r>
+          </a:p>
+          <a:p>
+            <a:pPr algn="l">
+              <a:defRPr sz="1400" b="0">
                 <a:solidFill>
                   <a:srgbClr val="FFFFFF"/>
                 </a:solidFill>
               </a:defRPr>
             </a:pPr>
             <a:r>
-              <a:t>Setup:           Download        OpenClaw req'd</a:t>
-            </a:r>
-          </a:p>
-          <a:p>
-            <a:pPr algn="l">
-              <a:defRPr sz="1300" b="0">
+              <a:t>• No OpenClaw needed, just your own API key</a:t>
+            </a:r>
+          </a:p>
+        </p:txBody>
+      </p:sp>
+      <p:sp>
+        <p:nvSpPr>
+          <p:cNvPr id="8" name="Rectangle 7"/>
+          <p:cNvSpPr/>
+          <p:nvPr/>
+        </p:nvSpPr>
+        <p:spPr>
+          <a:xfrm>
+            <a:off x="731520" y="3749039"/>
+            <a:ext cx="5029200" cy="1828800"/>
+          </a:xfrm>
+          <a:prstGeom prst="rect">
+            <a:avLst/>
+          </a:prstGeom>
+          <a:solidFill>
+            <a:srgbClr val="1E293B"/>
+          </a:solidFill>
+          <a:ln>
+            <a:noFill/>
+          </a:ln>
+          <a:effectLst/>
+        </p:spPr>
+        <p:style>
+          <a:lnRef idx="1">
+            <a:schemeClr val="accent1"/>
+          </a:lnRef>
+          <a:fillRef idx="3">
+            <a:schemeClr val="accent1"/>
+          </a:fillRef>
+          <a:effectRef idx="2">
+            <a:schemeClr val="accent1"/>
+          </a:effectRef>
+          <a:fontRef idx="minor">
+            <a:schemeClr val="lt1"/>
+          </a:fontRef>
+        </p:style>
+        <p:txBody>
+          <a:bodyPr rtlCol="0" anchor="ctr"/>
+          <a:lstStyle/>
+          <a:p>
+            <a:pPr algn="ctr"/>
+          </a:p>
+        </p:txBody>
+      </p:sp>
+      <p:sp>
+        <p:nvSpPr>
+          <p:cNvPr id="9" name="TextBox 8"/>
+          <p:cNvSpPr txBox="1"/>
+          <p:nvPr/>
+        </p:nvSpPr>
+        <p:spPr>
+          <a:xfrm>
+            <a:off x="914400" y="3840480"/>
+            <a:ext cx="4663440" cy="365760"/>
+          </a:xfrm>
+          <a:prstGeom prst="rect">
+            <a:avLst/>
+          </a:prstGeom>
+          <a:noFill/>
+        </p:spPr>
+        <p:txBody>
+          <a:bodyPr wrap="square">
+            <a:spAutoFit/>
+          </a:bodyPr>
+          <a:lstStyle/>
+          <a:p>
+            <a:pPr algn="l">
+              <a:defRPr sz="1800" b="1">
+                <a:solidFill>
+                  <a:srgbClr val="60A5FA"/>
+                </a:solidFill>
+              </a:defRPr>
+            </a:pPr>
+            <a:r>
+              <a:t>📋 Decision History</a:t>
+            </a:r>
+          </a:p>
+          <a:p>
+            <a:pPr algn="l">
+              <a:defRPr sz="1400" b="0">
                 <a:solidFill>
                   <a:srgbClr val="FFFFFF"/>
                 </a:solidFill>
               </a:defRPr>
             </a:pPr>
             <a:r>
-              <a:t>Notify:          On-screen       Telegram/Discord</a:t>
-            </a:r>
-          </a:p>
-          <a:p>
-            <a:pPr algn="l">
-              <a:defRPr sz="1300" b="0">
+              <a:t>• Full audit log of every Allow/Block decision</a:t>
+            </a:r>
+          </a:p>
+          <a:p>
+            <a:pPr algn="l">
+              <a:defRPr sz="1400" b="0">
                 <a:solidFill>
                   <a:srgbClr val="FFFFFF"/>
                 </a:solidFill>
               </a:defRPr>
             </a:pPr>
             <a:r>
-              <a:t>AI Analysis:  ✅ Full             ✅ Full</a:t>
-            </a:r>
-          </a:p>
-          <a:p>
-            <a:pPr algn="l">
-              <a:defRPr sz="1300" b="0">
+              <a:t>• Review past connections with timestamps</a:t>
+            </a:r>
+          </a:p>
+          <a:p>
+            <a:pPr algn="l">
+              <a:defRPr sz="1400" b="0">
                 <a:solidFill>
                   <a:srgbClr val="FFFFFF"/>
                 </a:solidFill>
               </a:defRPr>
             </a:pPr>
             <a:r>
-              <a:t>API Keys:     ✅ Multi-provider  Via OpenClaw</a:t>
-            </a:r>
-          </a:p>
-          <a:p>
-            <a:pPr algn="l">
-              <a:defRPr sz="1300" b="0">
+              <a:t>• Click to view AI analysis for any past alert</a:t>
+            </a:r>
+          </a:p>
+        </p:txBody>
+      </p:sp>
+      <p:sp>
+        <p:nvSpPr>
+          <p:cNvPr id="10" name="Rectangle 9"/>
+          <p:cNvSpPr/>
+          <p:nvPr/>
+        </p:nvSpPr>
+        <p:spPr>
+          <a:xfrm>
+            <a:off x="6400800" y="3749039"/>
+            <a:ext cx="5029200" cy="1828800"/>
+          </a:xfrm>
+          <a:prstGeom prst="rect">
+            <a:avLst/>
+          </a:prstGeom>
+          <a:solidFill>
+            <a:srgbClr val="1E293B"/>
+          </a:solidFill>
+          <a:ln>
+            <a:noFill/>
+          </a:ln>
+          <a:effectLst/>
+        </p:spPr>
+        <p:style>
+          <a:lnRef idx="1">
+            <a:schemeClr val="accent1"/>
+          </a:lnRef>
+          <a:fillRef idx="3">
+            <a:schemeClr val="accent1"/>
+          </a:fillRef>
+          <a:effectRef idx="2">
+            <a:schemeClr val="accent1"/>
+          </a:effectRef>
+          <a:fontRef idx="minor">
+            <a:schemeClr val="lt1"/>
+          </a:fontRef>
+        </p:style>
+        <p:txBody>
+          <a:bodyPr rtlCol="0" anchor="ctr"/>
+          <a:lstStyle/>
+          <a:p>
+            <a:pPr algn="ctr"/>
+          </a:p>
+        </p:txBody>
+      </p:sp>
+      <p:sp>
+        <p:nvSpPr>
+          <p:cNvPr id="11" name="TextBox 10"/>
+          <p:cNvSpPr txBox="1"/>
+          <p:nvPr/>
+        </p:nvSpPr>
+        <p:spPr>
+          <a:xfrm>
+            <a:off x="6583680" y="3840480"/>
+            <a:ext cx="4663440" cy="365760"/>
+          </a:xfrm>
+          <a:prstGeom prst="rect">
+            <a:avLst/>
+          </a:prstGeom>
+          <a:noFill/>
+        </p:spPr>
+        <p:txBody>
+          <a:bodyPr wrap="square">
+            <a:spAutoFit/>
+          </a:bodyPr>
+          <a:lstStyle/>
+          <a:p>
+            <a:pPr algn="l">
+              <a:defRPr sz="1800" b="1">
+                <a:solidFill>
+                  <a:srgbClr val="60A5FA"/>
+                </a:solidFill>
+              </a:defRPr>
+            </a:pPr>
+            <a:r>
+              <a:t>⚡ Easy Setup</a:t>
+            </a:r>
+          </a:p>
+          <a:p>
+            <a:pPr algn="l">
+              <a:defRPr sz="1400" b="0">
                 <a:solidFill>
                   <a:srgbClr val="FFFFFF"/>
                 </a:solidFill>
               </a:defRPr>
             </a:pPr>
             <a:r>
-              <a:t>History:        ✅ Local log      ✅ Chat history</a:t>
-            </a:r>
-          </a:p>
-          <a:p>
-            <a:pPr algn="l">
-              <a:defRPr sz="1300" b="0">
+              <a:t>• Download &amp; run, no dependencies</a:t>
+            </a:r>
+          </a:p>
+          <a:p>
+            <a:pPr algn="l">
+              <a:defRPr sz="1400" b="0">
                 <a:solidFill>
                   <a:srgbClr val="FFFFFF"/>
                 </a:solidFill>
               </a:defRPr>
             </a:pPr>
             <a:r>
-              <a:t>Remote:        ❌ Local           ✅ From phone</a:t>
-            </a:r>
-          </a:p>
-          <a:p>
-            <a:pPr algn="l">
-              <a:defRPr sz="1300" b="0">
+              <a:t>• Setup wizard walks through config</a:t>
+            </a:r>
+          </a:p>
+          <a:p>
+            <a:pPr algn="l">
+              <a:defRPr sz="1400" b="0">
                 <a:solidFill>
                   <a:srgbClr val="FFFFFF"/>
                 </a:solidFill>
               </a:defRPr>
             </a:pPr>
             <a:r>
-              <a:t>Auto:            ❌                  ✅ Auto-execute</a:t>
+              <a:t>• Works standalone on any Mac with LuLu</a:t>
             </a:r>
           </a:p>
         </p:txBody>

</xml_diff>